<commit_message>
Our laboratory (1.1 v)
</commit_message>
<xml_diff>
--- a/My_laboratory/My_laboratory.pptx
+++ b/My_laboratory/My_laboratory.pptx
@@ -113,7 +113,7 @@
   </p:defaultTextStyle>
   <p:extLst>
     <p:ext uri="{EFAFB233-063F-42B5-8137-9DF3F51BA10A}">
-      <p15:sldGuideLst xmlns="" xmlns:p15="http://schemas.microsoft.com/office/powerpoint/2012/main">
+      <p15:sldGuideLst xmlns:p15="http://schemas.microsoft.com/office/powerpoint/2012/main" xmlns="">
         <p15:guide id="1" orient="horz" pos="2160">
           <p15:clr>
             <a:srgbClr val="A4A3A4"/>
@@ -852,7 +852,7 @@
           <a:p>
             <a:fld id="{252F7152-2E34-4CF8-96E1-9C0B6BE1AFF1}" type="datetimeFigureOut">
               <a:rPr lang="ru-RU" smtClean="0"/>
-              <a:t>19.04.2015</a:t>
+              <a:t>20.04.2015</a:t>
             </a:fld>
             <a:endParaRPr lang="ru-RU"/>
           </a:p>
@@ -1103,7 +1103,7 @@
           <a:p>
             <a:fld id="{252F7152-2E34-4CF8-96E1-9C0B6BE1AFF1}" type="datetimeFigureOut">
               <a:rPr lang="ru-RU" smtClean="0"/>
-              <a:t>19.04.2015</a:t>
+              <a:t>20.04.2015</a:t>
             </a:fld>
             <a:endParaRPr lang="ru-RU"/>
           </a:p>
@@ -1417,7 +1417,7 @@
           <a:p>
             <a:fld id="{252F7152-2E34-4CF8-96E1-9C0B6BE1AFF1}" type="datetimeFigureOut">
               <a:rPr lang="ru-RU" smtClean="0"/>
-              <a:t>19.04.2015</a:t>
+              <a:t>20.04.2015</a:t>
             </a:fld>
             <a:endParaRPr lang="ru-RU"/>
           </a:p>
@@ -1758,7 +1758,7 @@
           <a:p>
             <a:fld id="{252F7152-2E34-4CF8-96E1-9C0B6BE1AFF1}" type="datetimeFigureOut">
               <a:rPr lang="ru-RU" smtClean="0"/>
-              <a:t>19.04.2015</a:t>
+              <a:t>20.04.2015</a:t>
             </a:fld>
             <a:endParaRPr lang="ru-RU"/>
           </a:p>
@@ -2072,7 +2072,7 @@
           <a:p>
             <a:fld id="{252F7152-2E34-4CF8-96E1-9C0B6BE1AFF1}" type="datetimeFigureOut">
               <a:rPr lang="ru-RU" smtClean="0"/>
-              <a:t>19.04.2015</a:t>
+              <a:t>20.04.2015</a:t>
             </a:fld>
             <a:endParaRPr lang="ru-RU"/>
           </a:p>
@@ -2465,7 +2465,7 @@
           <a:p>
             <a:fld id="{252F7152-2E34-4CF8-96E1-9C0B6BE1AFF1}" type="datetimeFigureOut">
               <a:rPr lang="ru-RU" smtClean="0"/>
-              <a:t>19.04.2015</a:t>
+              <a:t>20.04.2015</a:t>
             </a:fld>
             <a:endParaRPr lang="ru-RU"/>
           </a:p>
@@ -2635,7 +2635,7 @@
           <a:p>
             <a:fld id="{252F7152-2E34-4CF8-96E1-9C0B6BE1AFF1}" type="datetimeFigureOut">
               <a:rPr lang="ru-RU" smtClean="0"/>
-              <a:t>19.04.2015</a:t>
+              <a:t>20.04.2015</a:t>
             </a:fld>
             <a:endParaRPr lang="ru-RU"/>
           </a:p>
@@ -2815,7 +2815,7 @@
           <a:p>
             <a:fld id="{252F7152-2E34-4CF8-96E1-9C0B6BE1AFF1}" type="datetimeFigureOut">
               <a:rPr lang="ru-RU" smtClean="0"/>
-              <a:t>19.04.2015</a:t>
+              <a:t>20.04.2015</a:t>
             </a:fld>
             <a:endParaRPr lang="ru-RU"/>
           </a:p>
@@ -2991,7 +2991,7 @@
           <a:p>
             <a:fld id="{252F7152-2E34-4CF8-96E1-9C0B6BE1AFF1}" type="datetimeFigureOut">
               <a:rPr lang="ru-RU" smtClean="0"/>
-              <a:t>19.04.2015</a:t>
+              <a:t>20.04.2015</a:t>
             </a:fld>
             <a:endParaRPr lang="ru-RU"/>
           </a:p>
@@ -3238,7 +3238,7 @@
           <a:p>
             <a:fld id="{252F7152-2E34-4CF8-96E1-9C0B6BE1AFF1}" type="datetimeFigureOut">
               <a:rPr lang="ru-RU" smtClean="0"/>
-              <a:t>19.04.2015</a:t>
+              <a:t>20.04.2015</a:t>
             </a:fld>
             <a:endParaRPr lang="ru-RU"/>
           </a:p>
@@ -3470,7 +3470,7 @@
           <a:p>
             <a:fld id="{252F7152-2E34-4CF8-96E1-9C0B6BE1AFF1}" type="datetimeFigureOut">
               <a:rPr lang="ru-RU" smtClean="0"/>
-              <a:t>19.04.2015</a:t>
+              <a:t>20.04.2015</a:t>
             </a:fld>
             <a:endParaRPr lang="ru-RU"/>
           </a:p>
@@ -3844,7 +3844,7 @@
           <a:p>
             <a:fld id="{252F7152-2E34-4CF8-96E1-9C0B6BE1AFF1}" type="datetimeFigureOut">
               <a:rPr lang="ru-RU" smtClean="0"/>
-              <a:t>19.04.2015</a:t>
+              <a:t>20.04.2015</a:t>
             </a:fld>
             <a:endParaRPr lang="ru-RU"/>
           </a:p>
@@ -3967,7 +3967,7 @@
           <a:p>
             <a:fld id="{252F7152-2E34-4CF8-96E1-9C0B6BE1AFF1}" type="datetimeFigureOut">
               <a:rPr lang="ru-RU" smtClean="0"/>
-              <a:t>19.04.2015</a:t>
+              <a:t>20.04.2015</a:t>
             </a:fld>
             <a:endParaRPr lang="ru-RU"/>
           </a:p>
@@ -4062,7 +4062,7 @@
           <a:p>
             <a:fld id="{252F7152-2E34-4CF8-96E1-9C0B6BE1AFF1}" type="datetimeFigureOut">
               <a:rPr lang="ru-RU" smtClean="0"/>
-              <a:t>19.04.2015</a:t>
+              <a:t>20.04.2015</a:t>
             </a:fld>
             <a:endParaRPr lang="ru-RU"/>
           </a:p>
@@ -4317,7 +4317,7 @@
           <a:p>
             <a:fld id="{252F7152-2E34-4CF8-96E1-9C0B6BE1AFF1}" type="datetimeFigureOut">
               <a:rPr lang="ru-RU" smtClean="0"/>
-              <a:t>19.04.2015</a:t>
+              <a:t>20.04.2015</a:t>
             </a:fld>
             <a:endParaRPr lang="ru-RU"/>
           </a:p>
@@ -4580,7 +4580,7 @@
           <a:p>
             <a:fld id="{252F7152-2E34-4CF8-96E1-9C0B6BE1AFF1}" type="datetimeFigureOut">
               <a:rPr lang="ru-RU" smtClean="0"/>
-              <a:t>19.04.2015</a:t>
+              <a:t>20.04.2015</a:t>
             </a:fld>
             <a:endParaRPr lang="ru-RU"/>
           </a:p>
@@ -5323,7 +5323,7 @@
           <a:p>
             <a:fld id="{252F7152-2E34-4CF8-96E1-9C0B6BE1AFF1}" type="datetimeFigureOut">
               <a:rPr lang="ru-RU" smtClean="0"/>
-              <a:t>19.04.2015</a:t>
+              <a:t>20.04.2015</a:t>
             </a:fld>
             <a:endParaRPr lang="ru-RU"/>
           </a:p>
@@ -6049,19 +6049,40 @@
           </a:p>
           <a:p>
             <a:r>
+              <a:rPr lang="en-US" dirty="0"/>
+              <a:t>Low dose Digital Radiographic Installation</a:t>
+            </a:r>
+            <a:r>
+              <a:rPr lang="ru-RU" dirty="0"/>
+              <a:t> (</a:t>
+            </a:r>
+            <a:r>
+              <a:rPr lang="en-US" dirty="0"/>
+              <a:t>Siberia</a:t>
+            </a:r>
+            <a:r>
+              <a:rPr lang="ru-RU" dirty="0" smtClean="0"/>
+              <a:t>)</a:t>
+            </a:r>
+          </a:p>
+          <a:p>
+            <a:r>
+              <a:rPr lang="en-US" dirty="0"/>
+              <a:t>X-ray inspection system (</a:t>
+            </a:r>
+            <a:r>
+              <a:rPr lang="en-US" dirty="0" err="1"/>
+              <a:t>Sibscan</a:t>
+            </a:r>
+            <a:r>
               <a:rPr lang="en-US" dirty="0" smtClean="0"/>
-              <a:t>Analysis method</a:t>
-            </a:r>
+              <a:t>)</a:t>
+            </a:r>
+            <a:endParaRPr lang="ru-RU" dirty="0" smtClean="0"/>
           </a:p>
           <a:p>
             <a:r>
               <a:rPr lang="en-US" dirty="0" smtClean="0"/>
-              <a:t>Prospection method</a:t>
-            </a:r>
-          </a:p>
-          <a:p>
-            <a:r>
-              <a:rPr lang="en-US" dirty="0"/>
               <a:t>Concluding </a:t>
             </a:r>
             <a:r>
@@ -6079,7 +6100,7 @@
         </p:nvSpPr>
         <p:spPr>
           <a:xfrm>
-            <a:off x="5529128" y="1538243"/>
+            <a:off x="6905001" y="723050"/>
             <a:ext cx="3717421" cy="1538243"/>
           </a:xfrm>
           <a:prstGeom prst="wedgeEllipseCallout">
@@ -6122,7 +6143,7 @@
         </p:nvSpPr>
         <p:spPr>
           <a:xfrm>
-            <a:off x="6768267" y="2122698"/>
+            <a:off x="7998861" y="1307505"/>
             <a:ext cx="1750501" cy="369332"/>
           </a:xfrm>
           <a:prstGeom prst="rect">
@@ -8004,7 +8025,7 @@
   <a:extraClrSchemeLst/>
   <a:extLst>
     <a:ext uri="{05A4C25C-085E-4340-85A3-A5531E510DB2}">
-      <thm15:themeFamily xmlns="" xmlns:thm15="http://schemas.microsoft.com/office/thememl/2012/main" name="Facet" id="{C0C680CD-088A-49FC-A102-D699147F32B2}" vid="{CFBC31BA-B70F-4F30-BCAA-4F3011E16C4D}"/>
+      <thm15:themeFamily xmlns:thm15="http://schemas.microsoft.com/office/thememl/2012/main" xmlns="" name="Facet" id="{C0C680CD-088A-49FC-A102-D699147F32B2}" vid="{CFBC31BA-B70F-4F30-BCAA-4F3011E16C4D}"/>
     </a:ext>
   </a:extLst>
 </a:theme>

</xml_diff>